<commit_message>
upgrade doi prefix as suggested by @slint
</commit_message>
<xml_diff>
--- a/slides.pptx
+++ b/slides.pptx
@@ -3263,7 +3263,7 @@
             </a:pPr>
             <a:r>
               <a:rPr sz="2000"/>
-              <a:t>Museum für Naturkunde. (2024). Photo of Specimen BMT0009388. Zenodo. https://doi.org/10.5072/zenodo.13342373</a:t>
+              <a:t>Museum für Naturkunde. (2024). Photo of Specimen BMT0009388. Zenodo. https://doi.org/10.5281/zenodo.13342373</a:t>
             </a:r>
           </a:p>
           <a:p>
@@ -3371,7 +3371,7 @@
             </a:pPr>
             <a:r>
               <a:rPr sz="2000"/>
-              <a:t>Museum für Naturkunde. (2024). Photo of Specimen BMT0009388. Zenodo. https://doi.org/10.5072/zenodo.13342373 </a:t>
+              <a:t>Museum für Naturkunde. (2024). Photo of Specimen BMT0009388. Zenodo. https://doi.org/10.5281/zenodo.13342373 </a:t>
             </a:r>
             <a:r>
               <a:rPr sz="2000" b="1"/>
@@ -4670,7 +4670,7 @@
             </a:pPr>
             <a:r>
               <a:rPr sz="2000"/>
-              <a:t>Museum für Naturkunde. (2024). Photo of Specimen BMT0009388. Zenodo. https://doi.org/10.5072/zenodo.13342373</a:t>
+              <a:t>Museum für Naturkunde. (2024). Photo of Specimen BMT0009388. Zenodo. https://doi.org/10.5281/zenodo.13342373</a:t>
             </a:r>
           </a:p>
         </p:txBody>
@@ -4813,7 +4813,7 @@
               <a:rPr>
                 <a:latin typeface="Courier"/>
               </a:rPr>
-              <a:t>curl -L "https://doi.org/10.5072/zenodo.13342373"\
+              <a:t>curl -L "https://doi.org/10.5281/zenodo.13342373"\
  &gt; bug.tiff </a:t>
             </a:r>
           </a:p>
@@ -5149,7 +5149,7 @@
             <a:pPr lvl="0"/>
             <a:r>
               <a:rPr/>
-              <a:t>load https://doi.org/10.5072/zenodo.13342373</a:t>
+              <a:t>load https://doi.org/10.5281/zenodo.13342373</a:t>
             </a:r>
           </a:p>
           <a:p>

</xml_diff>